<commit_message>
Add two exercises; update slide on Python info
</commit_message>
<xml_diff>
--- a/Python/Exercises/python-exercises.pptx
+++ b/Python/Exercises/python-exercises.pptx
@@ -21,6 +21,8 @@
     <p:sldId id="264" r:id="rId15"/>
     <p:sldId id="269" r:id="rId16"/>
     <p:sldId id="265" r:id="rId17"/>
+    <p:sldId id="272" r:id="rId18"/>
+    <p:sldId id="273" r:id="rId19"/>
   </p:sldIdLst>
   <p:sldSz cx="9144000" cy="6858000" type="screen4x3"/>
   <p:notesSz cx="6858000" cy="9144000"/>
@@ -319,7 +321,7 @@
           <a:p>
             <a:fld id="{C49162B6-616C-4E28-8107-95FF99C88112}" type="datetimeFigureOut">
               <a:rPr lang="nl-BE" smtClean="0"/>
-              <a:t>15/11/2016</a:t>
+              <a:t>12/09/2019</a:t>
             </a:fld>
             <a:endParaRPr lang="nl-BE"/>
           </a:p>
@@ -489,7 +491,7 @@
           <a:p>
             <a:fld id="{C49162B6-616C-4E28-8107-95FF99C88112}" type="datetimeFigureOut">
               <a:rPr lang="nl-BE" smtClean="0"/>
-              <a:t>15/11/2016</a:t>
+              <a:t>12/09/2019</a:t>
             </a:fld>
             <a:endParaRPr lang="nl-BE"/>
           </a:p>
@@ -669,7 +671,7 @@
           <a:p>
             <a:fld id="{C49162B6-616C-4E28-8107-95FF99C88112}" type="datetimeFigureOut">
               <a:rPr lang="nl-BE" smtClean="0"/>
-              <a:t>15/11/2016</a:t>
+              <a:t>12/09/2019</a:t>
             </a:fld>
             <a:endParaRPr lang="nl-BE"/>
           </a:p>
@@ -839,7 +841,7 @@
           <a:p>
             <a:fld id="{C49162B6-616C-4E28-8107-95FF99C88112}" type="datetimeFigureOut">
               <a:rPr lang="nl-BE" smtClean="0"/>
-              <a:t>15/11/2016</a:t>
+              <a:t>12/09/2019</a:t>
             </a:fld>
             <a:endParaRPr lang="nl-BE"/>
           </a:p>
@@ -1085,7 +1087,7 @@
           <a:p>
             <a:fld id="{C49162B6-616C-4E28-8107-95FF99C88112}" type="datetimeFigureOut">
               <a:rPr lang="nl-BE" smtClean="0"/>
-              <a:t>15/11/2016</a:t>
+              <a:t>12/09/2019</a:t>
             </a:fld>
             <a:endParaRPr lang="nl-BE"/>
           </a:p>
@@ -1373,7 +1375,7 @@
           <a:p>
             <a:fld id="{C49162B6-616C-4E28-8107-95FF99C88112}" type="datetimeFigureOut">
               <a:rPr lang="nl-BE" smtClean="0"/>
-              <a:t>15/11/2016</a:t>
+              <a:t>12/09/2019</a:t>
             </a:fld>
             <a:endParaRPr lang="nl-BE"/>
           </a:p>
@@ -1795,7 +1797,7 @@
           <a:p>
             <a:fld id="{C49162B6-616C-4E28-8107-95FF99C88112}" type="datetimeFigureOut">
               <a:rPr lang="nl-BE" smtClean="0"/>
-              <a:t>15/11/2016</a:t>
+              <a:t>12/09/2019</a:t>
             </a:fld>
             <a:endParaRPr lang="nl-BE"/>
           </a:p>
@@ -1913,7 +1915,7 @@
           <a:p>
             <a:fld id="{C49162B6-616C-4E28-8107-95FF99C88112}" type="datetimeFigureOut">
               <a:rPr lang="nl-BE" smtClean="0"/>
-              <a:t>15/11/2016</a:t>
+              <a:t>12/09/2019</a:t>
             </a:fld>
             <a:endParaRPr lang="nl-BE"/>
           </a:p>
@@ -2008,7 +2010,7 @@
           <a:p>
             <a:fld id="{C49162B6-616C-4E28-8107-95FF99C88112}" type="datetimeFigureOut">
               <a:rPr lang="nl-BE" smtClean="0"/>
-              <a:t>15/11/2016</a:t>
+              <a:t>12/09/2019</a:t>
             </a:fld>
             <a:endParaRPr lang="nl-BE"/>
           </a:p>
@@ -2285,7 +2287,7 @@
           <a:p>
             <a:fld id="{C49162B6-616C-4E28-8107-95FF99C88112}" type="datetimeFigureOut">
               <a:rPr lang="nl-BE" smtClean="0"/>
-              <a:t>15/11/2016</a:t>
+              <a:t>12/09/2019</a:t>
             </a:fld>
             <a:endParaRPr lang="nl-BE"/>
           </a:p>
@@ -2538,7 +2540,7 @@
           <a:p>
             <a:fld id="{C49162B6-616C-4E28-8107-95FF99C88112}" type="datetimeFigureOut">
               <a:rPr lang="nl-BE" smtClean="0"/>
-              <a:t>15/11/2016</a:t>
+              <a:t>12/09/2019</a:t>
             </a:fld>
             <a:endParaRPr lang="nl-BE"/>
           </a:p>
@@ -2751,7 +2753,7 @@
           <a:p>
             <a:fld id="{C49162B6-616C-4E28-8107-95FF99C88112}" type="datetimeFigureOut">
               <a:rPr lang="nl-BE" smtClean="0"/>
-              <a:t>15/11/2016</a:t>
+              <a:t>12/09/2019</a:t>
             </a:fld>
             <a:endParaRPr lang="nl-BE"/>
           </a:p>
@@ -6855,6 +6857,270 @@
 </p:sld>
 </file>
 
+<file path=ppt/slides/slide17.xml><?xml version="1.0" encoding="utf-8"?>
+<p:sld xmlns:a="http://schemas.openxmlformats.org/drawingml/2006/main" xmlns:r="http://schemas.openxmlformats.org/officeDocument/2006/relationships" xmlns:p="http://schemas.openxmlformats.org/presentationml/2006/main">
+  <p:cSld>
+    <p:spTree>
+      <p:nvGrpSpPr>
+        <p:cNvPr id="1" name=""/>
+        <p:cNvGrpSpPr/>
+        <p:nvPr/>
+      </p:nvGrpSpPr>
+      <p:grpSpPr>
+        <a:xfrm>
+          <a:off x="0" y="0"/>
+          <a:ext cx="0" cy="0"/>
+          <a:chOff x="0" y="0"/>
+          <a:chExt cx="0" cy="0"/>
+        </a:xfrm>
+      </p:grpSpPr>
+      <p:sp>
+        <p:nvSpPr>
+          <p:cNvPr id="2" name="Title 1"/>
+          <p:cNvSpPr>
+            <a:spLocks noGrp="1"/>
+          </p:cNvSpPr>
+          <p:nvPr>
+            <p:ph type="title"/>
+          </p:nvPr>
+        </p:nvSpPr>
+        <p:spPr/>
+        <p:txBody>
+          <a:bodyPr/>
+          <a:lstStyle/>
+          <a:p>
+            <a:r>
+              <a:rPr lang="en-US" dirty="0" smtClean="0"/>
+              <a:t>Human numbers</a:t>
+            </a:r>
+            <a:endParaRPr lang="en-US" dirty="0"/>
+          </a:p>
+        </p:txBody>
+      </p:sp>
+      <p:sp>
+        <p:nvSpPr>
+          <p:cNvPr id="3" name="Content Placeholder 2"/>
+          <p:cNvSpPr>
+            <a:spLocks noGrp="1"/>
+          </p:cNvSpPr>
+          <p:nvPr>
+            <p:ph idx="1"/>
+          </p:nvPr>
+        </p:nvSpPr>
+        <p:spPr/>
+        <p:txBody>
+          <a:bodyPr/>
+          <a:lstStyle/>
+          <a:p>
+            <a:r>
+              <a:rPr lang="en-US" dirty="0" smtClean="0"/>
+              <a:t>Write a function that converts a floating point value to a "human-readable" format.</a:t>
+            </a:r>
+            <a:br>
+              <a:rPr lang="en-US" dirty="0" smtClean="0"/>
+            </a:br>
+            <a:r>
+              <a:rPr lang="en-US" dirty="0" smtClean="0"/>
+              <a:t>For example, the floating point value </a:t>
+            </a:r>
+            <a:r>
+              <a:rPr lang="en-US" dirty="0" smtClean="0">
+                <a:latin typeface="Courier New" panose="02070309020205020404" pitchFamily="49" charset="0"/>
+                <a:cs typeface="Courier New" panose="02070309020205020404" pitchFamily="49" charset="0"/>
+              </a:rPr>
+              <a:t>1234.5</a:t>
+            </a:r>
+            <a:r>
+              <a:rPr lang="en-US" dirty="0" smtClean="0"/>
+              <a:t> would be converted to the string </a:t>
+            </a:r>
+            <a:r>
+              <a:rPr lang="en-US" dirty="0" smtClean="0">
+                <a:latin typeface="Courier New" panose="02070309020205020404" pitchFamily="49" charset="0"/>
+                <a:cs typeface="Courier New" panose="02070309020205020404" pitchFamily="49" charset="0"/>
+              </a:rPr>
+              <a:t>'1.23 K'</a:t>
+            </a:r>
+            <a:r>
+              <a:rPr lang="en-US" dirty="0" smtClean="0"/>
+              <a:t>.</a:t>
+            </a:r>
+            <a:endParaRPr lang="en-US" dirty="0"/>
+          </a:p>
+        </p:txBody>
+      </p:sp>
+    </p:spTree>
+    <p:extLst>
+      <p:ext uri="{BB962C8B-B14F-4D97-AF65-F5344CB8AC3E}">
+        <p14:creationId xmlns:p14="http://schemas.microsoft.com/office/powerpoint/2010/main" val="1875192474"/>
+      </p:ext>
+    </p:extLst>
+  </p:cSld>
+  <p:clrMapOvr>
+    <a:masterClrMapping/>
+  </p:clrMapOvr>
+  <p:timing>
+    <p:tnLst>
+      <p:par>
+        <p:cTn id="1" dur="indefinite" restart="never" nodeType="tmRoot"/>
+      </p:par>
+    </p:tnLst>
+  </p:timing>
+</p:sld>
+</file>
+
+<file path=ppt/slides/slide18.xml><?xml version="1.0" encoding="utf-8"?>
+<p:sld xmlns:a="http://schemas.openxmlformats.org/drawingml/2006/main" xmlns:r="http://schemas.openxmlformats.org/officeDocument/2006/relationships" xmlns:p="http://schemas.openxmlformats.org/presentationml/2006/main">
+  <p:cSld>
+    <p:spTree>
+      <p:nvGrpSpPr>
+        <p:cNvPr id="1" name=""/>
+        <p:cNvGrpSpPr/>
+        <p:nvPr/>
+      </p:nvGrpSpPr>
+      <p:grpSpPr>
+        <a:xfrm>
+          <a:off x="0" y="0"/>
+          <a:ext cx="0" cy="0"/>
+          <a:chOff x="0" y="0"/>
+          <a:chExt cx="0" cy="0"/>
+        </a:xfrm>
+      </p:grpSpPr>
+      <p:sp>
+        <p:nvSpPr>
+          <p:cNvPr id="2" name="Title 1"/>
+          <p:cNvSpPr>
+            <a:spLocks noGrp="1"/>
+          </p:cNvSpPr>
+          <p:nvPr>
+            <p:ph type="title"/>
+          </p:nvPr>
+        </p:nvSpPr>
+        <p:spPr/>
+        <p:txBody>
+          <a:bodyPr/>
+          <a:lstStyle/>
+          <a:p>
+            <a:r>
+              <a:rPr lang="en-US" dirty="0" smtClean="0"/>
+              <a:t>Colorize</a:t>
+            </a:r>
+            <a:endParaRPr lang="en-US" dirty="0"/>
+          </a:p>
+        </p:txBody>
+      </p:sp>
+      <p:sp>
+        <p:nvSpPr>
+          <p:cNvPr id="3" name="Content Placeholder 2"/>
+          <p:cNvSpPr>
+            <a:spLocks noGrp="1"/>
+          </p:cNvSpPr>
+          <p:nvPr>
+            <p:ph idx="1"/>
+          </p:nvPr>
+        </p:nvSpPr>
+        <p:spPr/>
+        <p:txBody>
+          <a:bodyPr>
+            <a:normAutofit fontScale="85000" lnSpcReduction="10000"/>
+          </a:bodyPr>
+          <a:lstStyle/>
+          <a:p>
+            <a:r>
+              <a:rPr lang="en-US" dirty="0" smtClean="0"/>
+              <a:t>Colored or styled output in terminals that support it is a matter of writing the correct control sequences to standard output or standard error. Write a function that takes a string and a style, and converts the string so that it would be displayed appropriately if the terminal supports color output.</a:t>
+            </a:r>
+            <a:br>
+              <a:rPr lang="en-US" dirty="0" smtClean="0"/>
+            </a:br>
+            <a:r>
+              <a:rPr lang="en-US" dirty="0" smtClean="0"/>
+              <a:t>E.g., to print the string </a:t>
+            </a:r>
+            <a:r>
+              <a:rPr lang="en-US" dirty="0" smtClean="0">
+                <a:latin typeface="Courier New" panose="02070309020205020404" pitchFamily="49" charset="0"/>
+                <a:cs typeface="Courier New" panose="02070309020205020404" pitchFamily="49" charset="0"/>
+              </a:rPr>
+              <a:t>'test'</a:t>
+            </a:r>
+            <a:r>
+              <a:rPr lang="en-US" dirty="0" smtClean="0"/>
+              <a:t> in red, characters, you have </a:t>
+            </a:r>
+            <a:r>
+              <a:rPr lang="en-US" dirty="0"/>
+              <a:t>to print </a:t>
+            </a:r>
+            <a:r>
+              <a:rPr lang="en-US" dirty="0">
+                <a:latin typeface="Courier New" panose="02070309020205020404" pitchFamily="49" charset="0"/>
+                <a:cs typeface="Courier New" panose="02070309020205020404" pitchFamily="49" charset="0"/>
+              </a:rPr>
+              <a:t>'\</a:t>
+            </a:r>
+            <a:r>
+              <a:rPr lang="en-US" dirty="0" smtClean="0">
+                <a:latin typeface="Courier New" panose="02070309020205020404" pitchFamily="49" charset="0"/>
+                <a:cs typeface="Courier New" panose="02070309020205020404" pitchFamily="49" charset="0"/>
+              </a:rPr>
+              <a:t>033[91mtest\033[0m'</a:t>
+            </a:r>
+            <a:r>
+              <a:rPr lang="en-US" dirty="0" smtClean="0"/>
+              <a:t>. Terminals that support color output are, e.g., </a:t>
+            </a:r>
+            <a:r>
+              <a:rPr lang="en-US" dirty="0" err="1" smtClean="0"/>
+              <a:t>xterm</a:t>
+            </a:r>
+            <a:r>
+              <a:rPr lang="en-US" dirty="0" smtClean="0"/>
+              <a:t> and </a:t>
+            </a:r>
+            <a:r>
+              <a:rPr lang="en-US" dirty="0" err="1" smtClean="0"/>
+              <a:t>rxvt</a:t>
+            </a:r>
+            <a:r>
+              <a:rPr lang="en-US" dirty="0" smtClean="0"/>
+              <a:t>, and the terminal information is stored in the </a:t>
+            </a:r>
+            <a:r>
+              <a:rPr lang="en-US" dirty="0" smtClean="0">
+                <a:latin typeface="Courier New" panose="02070309020205020404" pitchFamily="49" charset="0"/>
+                <a:cs typeface="Courier New" panose="02070309020205020404" pitchFamily="49" charset="0"/>
+              </a:rPr>
+              <a:t>TERM</a:t>
+            </a:r>
+            <a:r>
+              <a:rPr lang="en-US" dirty="0" smtClean="0"/>
+              <a:t> environment variable.</a:t>
+            </a:r>
+            <a:endParaRPr lang="en-US" dirty="0"/>
+          </a:p>
+        </p:txBody>
+      </p:sp>
+    </p:spTree>
+    <p:extLst>
+      <p:ext uri="{BB962C8B-B14F-4D97-AF65-F5344CB8AC3E}">
+        <p14:creationId xmlns:p14="http://schemas.microsoft.com/office/powerpoint/2010/main" val="339834835"/>
+      </p:ext>
+    </p:extLst>
+  </p:cSld>
+  <p:clrMapOvr>
+    <a:masterClrMapping/>
+  </p:clrMapOvr>
+  <p:timing>
+    <p:tnLst>
+      <p:par>
+        <p:cTn id="1" dur="indefinite" restart="never" nodeType="tmRoot"/>
+      </p:par>
+    </p:tnLst>
+  </p:timing>
+</p:sld>
+</file>
+
 <file path=ppt/slides/slide2.xml><?xml version="1.0" encoding="utf-8"?>
 <p:sld xmlns:a="http://schemas.openxmlformats.org/drawingml/2006/main" xmlns:r="http://schemas.openxmlformats.org/officeDocument/2006/relationships" xmlns:p="http://schemas.openxmlformats.org/presentationml/2006/main">
   <p:cSld>
@@ -6925,7 +7191,11 @@
             </a:r>
             <a:r>
               <a:rPr lang="en-US" dirty="0" err="1" smtClean="0"/>
-              <a:t>kedit</a:t>
+              <a:t>k</a:t>
+            </a:r>
+            <a:r>
+              <a:rPr lang="en-US" dirty="0" err="1" smtClean="0"/>
+              <a:t>edit</a:t>
             </a:r>
             <a:r>
               <a:rPr lang="en-US" dirty="0" smtClean="0"/>
@@ -6942,8 +7212,13 @@
           <a:p>
             <a:r>
               <a:rPr lang="en-US" dirty="0" smtClean="0"/>
-              <a:t>On Thinking</a:t>
-            </a:r>
+              <a:t>On </a:t>
+            </a:r>
+            <a:r>
+              <a:rPr lang="en-US" dirty="0" smtClean="0"/>
+              <a:t>VSC clusters</a:t>
+            </a:r>
+            <a:endParaRPr lang="en-US" dirty="0" smtClean="0"/>
           </a:p>
           <a:p>
             <a:pPr lvl="1"/>
@@ -6972,27 +7247,46 @@
             <a:pPr lvl="1"/>
             <a:r>
               <a:rPr lang="en-US" dirty="0" smtClean="0"/>
-              <a:t>Load appropriate module</a:t>
-            </a:r>
+              <a:t>Load appropriate </a:t>
+            </a:r>
+            <a:r>
+              <a:rPr lang="en-US" dirty="0" smtClean="0"/>
+              <a:t>module, e.g.,</a:t>
+            </a:r>
+            <a:endParaRPr lang="en-US" dirty="0" smtClean="0"/>
           </a:p>
           <a:p>
             <a:pPr lvl="2"/>
             <a:r>
-              <a:rPr lang="en-US" dirty="0" smtClean="0"/>
-              <a:t>Python/2.7.6-intel-2014a</a:t>
-            </a:r>
-          </a:p>
-          <a:p>
-            <a:r>
-              <a:rPr lang="en-US" dirty="0" smtClean="0"/>
-              <a:t>Online (last resort)</a:t>
-            </a:r>
+              <a:rPr lang="en-US" dirty="0"/>
+              <a:t>Python/3.6.4-foss-2018a</a:t>
+            </a:r>
+            <a:endParaRPr lang="en-US" dirty="0" smtClean="0"/>
+          </a:p>
+          <a:p>
+            <a:r>
+              <a:rPr lang="en-US" dirty="0" smtClean="0"/>
+              <a:t>Online</a:t>
+            </a:r>
+            <a:endParaRPr lang="en-US" dirty="0" smtClean="0"/>
           </a:p>
           <a:p>
             <a:pPr lvl="1"/>
             <a:r>
-              <a:rPr lang="en-US" dirty="0" smtClean="0"/>
-              <a:t>http://repl.it</a:t>
+              <a:rPr lang="en-US" dirty="0">
+                <a:hlinkClick r:id="rId2"/>
+              </a:rPr>
+              <a:t>https://colab.research.google.com</a:t>
+            </a:r>
+            <a:r>
+              <a:rPr lang="en-US" dirty="0" smtClean="0">
+                <a:hlinkClick r:id="rId2"/>
+              </a:rPr>
+              <a:t>/</a:t>
+            </a:r>
+            <a:r>
+              <a:rPr lang="en-US" dirty="0" smtClean="0"/>
+              <a:t> </a:t>
             </a:r>
             <a:endParaRPr lang="en-US" dirty="0"/>
           </a:p>
@@ -7228,67 +7522,25 @@
                 <a:latin typeface="Courier New" pitchFamily="49" charset="0"/>
                 <a:cs typeface="Courier New" pitchFamily="49" charset="0"/>
               </a:rPr>
-              <a:t>3 </a:t>
+              <a:t>3 hours, 11 minutes, 12 seconds</a:t>
+            </a:r>
+            <a:r>
+              <a:rPr lang="en-US" dirty="0" smtClean="0"/>
+              <a:t>, convert it to the total number of seconds.</a:t>
+            </a:r>
+          </a:p>
+          <a:p>
+            <a:pPr lvl="1"/>
+            <a:r>
+              <a:rPr lang="en-US" dirty="0" smtClean="0"/>
+              <a:t>Do not assume that all of hours, minutes and seconds are given, e.g., </a:t>
             </a:r>
             <a:r>
               <a:rPr lang="en-US" dirty="0" smtClean="0">
                 <a:latin typeface="Courier New" pitchFamily="49" charset="0"/>
                 <a:cs typeface="Courier New" pitchFamily="49" charset="0"/>
               </a:rPr>
-              <a:t>hours, </a:t>
-            </a:r>
-            <a:r>
-              <a:rPr lang="en-US" dirty="0" smtClean="0">
-                <a:latin typeface="Courier New" pitchFamily="49" charset="0"/>
-                <a:cs typeface="Courier New" pitchFamily="49" charset="0"/>
-              </a:rPr>
-              <a:t>11 </a:t>
-            </a:r>
-            <a:r>
-              <a:rPr lang="en-US" dirty="0" smtClean="0">
-                <a:latin typeface="Courier New" pitchFamily="49" charset="0"/>
-                <a:cs typeface="Courier New" pitchFamily="49" charset="0"/>
-              </a:rPr>
-              <a:t>minutes, </a:t>
-            </a:r>
-            <a:r>
-              <a:rPr lang="en-US" dirty="0" smtClean="0">
-                <a:latin typeface="Courier New" pitchFamily="49" charset="0"/>
-                <a:cs typeface="Courier New" pitchFamily="49" charset="0"/>
-              </a:rPr>
-              <a:t>12 seconds</a:t>
-            </a:r>
-            <a:r>
-              <a:rPr lang="en-US" dirty="0" smtClean="0"/>
-              <a:t>, convert it to the total number of seconds.</a:t>
-            </a:r>
-          </a:p>
-          <a:p>
-            <a:pPr lvl="1"/>
-            <a:r>
-              <a:rPr lang="en-US" dirty="0" smtClean="0"/>
-              <a:t>Do not assume that all of hours, minutes and seconds are given, e.g., </a:t>
-            </a:r>
-            <a:r>
-              <a:rPr lang="en-US" dirty="0" smtClean="0">
-                <a:latin typeface="Courier New" pitchFamily="49" charset="0"/>
-                <a:cs typeface="Courier New" pitchFamily="49" charset="0"/>
-              </a:rPr>
-              <a:t>2 </a:t>
-            </a:r>
-            <a:r>
-              <a:rPr lang="en-US" dirty="0" smtClean="0">
-                <a:latin typeface="Courier New" pitchFamily="49" charset="0"/>
-                <a:cs typeface="Courier New" pitchFamily="49" charset="0"/>
-              </a:rPr>
-              <a:t>hours, </a:t>
-            </a:r>
-            <a:r>
-              <a:rPr lang="en-US" dirty="0" smtClean="0">
-                <a:latin typeface="Courier New" pitchFamily="49" charset="0"/>
-                <a:cs typeface="Courier New" pitchFamily="49" charset="0"/>
-              </a:rPr>
-              <a:t>45 seconds</a:t>
+              <a:t>2 hours, 45 seconds</a:t>
             </a:r>
             <a:r>
               <a:rPr lang="en-US" dirty="0" smtClean="0"/>
@@ -7379,21 +7631,7 @@
                 <a:latin typeface="Courier New" pitchFamily="49" charset="0"/>
                 <a:cs typeface="Courier New" pitchFamily="49" charset="0"/>
               </a:rPr>
-              <a:t>2 </a:t>
-            </a:r>
-            <a:r>
-              <a:rPr lang="en-US" dirty="0" smtClean="0">
-                <a:latin typeface="Courier New" pitchFamily="49" charset="0"/>
-                <a:cs typeface="Courier New" pitchFamily="49" charset="0"/>
-              </a:rPr>
-              <a:t>hours, </a:t>
-            </a:r>
-            <a:r>
-              <a:rPr lang="en-US" dirty="0" smtClean="0">
-                <a:latin typeface="Courier New" pitchFamily="49" charset="0"/>
-                <a:cs typeface="Courier New" pitchFamily="49" charset="0"/>
-              </a:rPr>
-              <a:t>3 m, 5 seconds</a:t>
+              <a:t>2 hours, 3 m, 5 seconds</a:t>
             </a:r>
             <a:endParaRPr lang="en-US" dirty="0">
               <a:latin typeface="Courier New" pitchFamily="49" charset="0"/>
@@ -8677,15 +8915,7 @@
           <a:p>
             <a:r>
               <a:rPr lang="en-US" dirty="0" smtClean="0"/>
-              <a:t>Write a program that </a:t>
-            </a:r>
-            <a:r>
-              <a:rPr lang="en-US" dirty="0" smtClean="0"/>
-              <a:t>attempts </a:t>
-            </a:r>
-            <a:r>
-              <a:rPr lang="en-US" dirty="0" smtClean="0"/>
-              <a:t>to convert a phone number based on a given dictionary of words, assume the phone number doesn't contain 0 and 1, assume </a:t>
+              <a:t>Write a program that attempts to convert a phone number based on a given dictionary of words, assume the phone number doesn't contain 0 and 1, assume </a:t>
             </a:r>
             <a:r>
               <a:rPr lang="en-US" dirty="0" err="1" smtClean="0"/>
@@ -8693,11 +8923,7 @@
             </a:r>
             <a:r>
               <a:rPr lang="en-US" dirty="0" smtClean="0"/>
-              <a:t> </a:t>
-            </a:r>
-            <a:r>
-              <a:rPr lang="en-US" dirty="0" smtClean="0"/>
-              <a:t>is allowed.</a:t>
+              <a:t> is allowed.</a:t>
             </a:r>
           </a:p>
           <a:p>

</xml_diff>